<commit_message>
merge dev and perimeter
Signed-off-by: flihp27 <philippe.foucault@sct.gouv.qc.ca>
</commit_message>
<xml_diff>
--- a/doc/node-installation/AWS-SEA Node Architecture.pptx
+++ b/doc/node-installation/AWS-SEA Node Architecture.pptx
@@ -259,7 +259,7 @@
           <a:p>
             <a:fld id="{3424B750-4155-1B4B-A5CF-112DCC5C7B83}" type="datetimeFigureOut">
               <a:rPr lang="en-US" smtClean="0"/>
-              <a:t>10/19/21</a:t>
+              <a:t>10/21/21</a:t>
             </a:fld>
             <a:endParaRPr lang="en-US"/>
           </a:p>
@@ -457,7 +457,7 @@
           <a:p>
             <a:fld id="{3424B750-4155-1B4B-A5CF-112DCC5C7B83}" type="datetimeFigureOut">
               <a:rPr lang="en-US" smtClean="0"/>
-              <a:t>10/19/21</a:t>
+              <a:t>10/21/21</a:t>
             </a:fld>
             <a:endParaRPr lang="en-US"/>
           </a:p>
@@ -665,7 +665,7 @@
           <a:p>
             <a:fld id="{3424B750-4155-1B4B-A5CF-112DCC5C7B83}" type="datetimeFigureOut">
               <a:rPr lang="en-US" smtClean="0"/>
-              <a:t>10/19/21</a:t>
+              <a:t>10/21/21</a:t>
             </a:fld>
             <a:endParaRPr lang="en-US"/>
           </a:p>
@@ -863,7 +863,7 @@
           <a:p>
             <a:fld id="{3424B750-4155-1B4B-A5CF-112DCC5C7B83}" type="datetimeFigureOut">
               <a:rPr lang="en-US" smtClean="0"/>
-              <a:t>10/19/21</a:t>
+              <a:t>10/21/21</a:t>
             </a:fld>
             <a:endParaRPr lang="en-US"/>
           </a:p>
@@ -1138,7 +1138,7 @@
           <a:p>
             <a:fld id="{3424B750-4155-1B4B-A5CF-112DCC5C7B83}" type="datetimeFigureOut">
               <a:rPr lang="en-US" smtClean="0"/>
-              <a:t>10/19/21</a:t>
+              <a:t>10/21/21</a:t>
             </a:fld>
             <a:endParaRPr lang="en-US"/>
           </a:p>
@@ -1403,7 +1403,7 @@
           <a:p>
             <a:fld id="{3424B750-4155-1B4B-A5CF-112DCC5C7B83}" type="datetimeFigureOut">
               <a:rPr lang="en-US" smtClean="0"/>
-              <a:t>10/19/21</a:t>
+              <a:t>10/21/21</a:t>
             </a:fld>
             <a:endParaRPr lang="en-US"/>
           </a:p>
@@ -1815,7 +1815,7 @@
           <a:p>
             <a:fld id="{3424B750-4155-1B4B-A5CF-112DCC5C7B83}" type="datetimeFigureOut">
               <a:rPr lang="en-US" smtClean="0"/>
-              <a:t>10/19/21</a:t>
+              <a:t>10/21/21</a:t>
             </a:fld>
             <a:endParaRPr lang="en-US"/>
           </a:p>
@@ -1956,7 +1956,7 @@
           <a:p>
             <a:fld id="{3424B750-4155-1B4B-A5CF-112DCC5C7B83}" type="datetimeFigureOut">
               <a:rPr lang="en-US" smtClean="0"/>
-              <a:t>10/19/21</a:t>
+              <a:t>10/21/21</a:t>
             </a:fld>
             <a:endParaRPr lang="en-US"/>
           </a:p>
@@ -2069,7 +2069,7 @@
           <a:p>
             <a:fld id="{3424B750-4155-1B4B-A5CF-112DCC5C7B83}" type="datetimeFigureOut">
               <a:rPr lang="en-US" smtClean="0"/>
-              <a:t>10/19/21</a:t>
+              <a:t>10/21/21</a:t>
             </a:fld>
             <a:endParaRPr lang="en-US"/>
           </a:p>
@@ -2380,7 +2380,7 @@
           <a:p>
             <a:fld id="{3424B750-4155-1B4B-A5CF-112DCC5C7B83}" type="datetimeFigureOut">
               <a:rPr lang="en-US" smtClean="0"/>
-              <a:t>10/19/21</a:t>
+              <a:t>10/21/21</a:t>
             </a:fld>
             <a:endParaRPr lang="en-US"/>
           </a:p>
@@ -2668,7 +2668,7 @@
           <a:p>
             <a:fld id="{3424B750-4155-1B4B-A5CF-112DCC5C7B83}" type="datetimeFigureOut">
               <a:rPr lang="en-US" smtClean="0"/>
-              <a:t>10/19/21</a:t>
+              <a:t>10/21/21</a:t>
             </a:fld>
             <a:endParaRPr lang="en-US"/>
           </a:p>
@@ -2909,7 +2909,7 @@
           <a:p>
             <a:fld id="{3424B750-4155-1B4B-A5CF-112DCC5C7B83}" type="datetimeFigureOut">
               <a:rPr lang="en-US" smtClean="0"/>
-              <a:t>10/19/21</a:t>
+              <a:t>10/21/21</a:t>
             </a:fld>
             <a:endParaRPr lang="en-US"/>
           </a:p>
@@ -3340,7 +3340,7 @@
         </p:nvSpPr>
         <p:spPr>
           <a:xfrm>
-            <a:off x="10330749" y="1556682"/>
+            <a:off x="10776764" y="1532396"/>
             <a:ext cx="1240221" cy="1839310"/>
           </a:xfrm>
           <a:prstGeom prst="rect">
@@ -3396,7 +3396,7 @@
         </p:nvSpPr>
         <p:spPr>
           <a:xfrm>
-            <a:off x="10330750" y="3746672"/>
+            <a:off x="10776765" y="3722386"/>
             <a:ext cx="1240221" cy="1839310"/>
           </a:xfrm>
           <a:prstGeom prst="rect">
@@ -3457,7 +3457,7 @@
         </p:nvSpPr>
         <p:spPr>
           <a:xfrm>
-            <a:off x="8728959" y="4897821"/>
+            <a:off x="9244561" y="4876535"/>
             <a:ext cx="1240221" cy="1839310"/>
           </a:xfrm>
           <a:prstGeom prst="rect">
@@ -3513,7 +3513,7 @@
         </p:nvSpPr>
         <p:spPr>
           <a:xfrm>
-            <a:off x="8652479" y="142155"/>
+            <a:off x="9280544" y="142155"/>
             <a:ext cx="1240221" cy="1839310"/>
           </a:xfrm>
           <a:prstGeom prst="rect">
@@ -3599,7 +3599,7 @@
         <p:spPr>
           <a:xfrm>
             <a:off x="183930" y="161965"/>
-            <a:ext cx="7737445" cy="5035400"/>
+            <a:ext cx="7737445" cy="5139708"/>
           </a:xfrm>
           <a:prstGeom prst="rect">
             <a:avLst/>
@@ -3624,7 +3624,7 @@
           </a:fontRef>
         </p:style>
         <p:txBody>
-          <a:bodyPr rtlCol="0" anchor="ctr"/>
+          <a:bodyPr rtlCol="0" anchor="t"/>
           <a:lstStyle/>
           <a:p>
             <a:pPr algn="ctr"/>
@@ -3653,10 +3653,10 @@
         </p:nvGrpSpPr>
         <p:grpSpPr>
           <a:xfrm>
-            <a:off x="309465" y="325163"/>
-            <a:ext cx="3516299" cy="2192034"/>
-            <a:chOff x="973508" y="2299817"/>
-            <a:chExt cx="3516299" cy="2192034"/>
+            <a:off x="309466" y="454467"/>
+            <a:ext cx="2466904" cy="2192034"/>
+            <a:chOff x="973509" y="2299817"/>
+            <a:chExt cx="2466904" cy="2192034"/>
           </a:xfrm>
         </p:grpSpPr>
         <p:sp>
@@ -3750,8 +3750,8 @@
           </p:nvSpPr>
           <p:spPr>
             <a:xfrm>
-              <a:off x="973508" y="2299817"/>
-              <a:ext cx="3516299" cy="2192034"/>
+              <a:off x="973509" y="2299817"/>
+              <a:ext cx="2466904" cy="2192034"/>
             </a:xfrm>
             <a:prstGeom prst="rect">
               <a:avLst/>
@@ -3779,7 +3779,7 @@
             <a:bodyPr rtlCol="0" anchor="ctr"/>
             <a:lstStyle/>
             <a:p>
-              <a:pPr algn="ctr"/>
+              <a:pPr algn="r"/>
               <a:r>
                 <a:rPr lang="en-US" dirty="0">
                   <a:solidFill>
@@ -3790,7 +3790,7 @@
               </a:r>
             </a:p>
             <a:p>
-              <a:pPr algn="ctr"/>
+              <a:pPr algn="r"/>
               <a:r>
                 <a:rPr lang="en-US" dirty="0">
                   <a:solidFill>
@@ -3801,7 +3801,7 @@
               </a:r>
             </a:p>
             <a:p>
-              <a:pPr algn="ctr"/>
+              <a:pPr algn="r"/>
               <a:r>
                 <a:rPr lang="en-US" dirty="0">
                   <a:solidFill>
@@ -3814,398 +3814,368 @@
           </p:txBody>
         </p:sp>
       </p:grpSp>
-      <p:grpSp>
-        <p:nvGrpSpPr>
-          <p:cNvPr id="3" name="Group 2">
-            <a:extLst>
-              <a:ext uri="{FF2B5EF4-FFF2-40B4-BE49-F238E27FC236}">
-                <a16:creationId xmlns:a16="http://schemas.microsoft.com/office/drawing/2014/main" id="{C89D3992-855D-D64C-B674-867CDB06D533}"/>
-              </a:ext>
-            </a:extLst>
-          </p:cNvPr>
-          <p:cNvGrpSpPr/>
+      <p:sp>
+        <p:nvSpPr>
+          <p:cNvPr id="27" name="Rectangle 26">
+            <a:extLst>
+              <a:ext uri="{FF2B5EF4-FFF2-40B4-BE49-F238E27FC236}">
+                <a16:creationId xmlns:a16="http://schemas.microsoft.com/office/drawing/2014/main" id="{92CBB52F-3EB0-444A-B99F-7171E9BCC9C8}"/>
+              </a:ext>
+            </a:extLst>
+          </p:cNvPr>
+          <p:cNvSpPr/>
           <p:nvPr/>
-        </p:nvGrpSpPr>
-        <p:grpSpPr>
+        </p:nvSpPr>
+        <p:spPr>
           <a:xfrm>
-            <a:off x="309464" y="2821399"/>
-            <a:ext cx="3516299" cy="2192034"/>
-            <a:chOff x="973507" y="4844640"/>
-            <a:chExt cx="3516299" cy="2192034"/>
+            <a:off x="534135" y="2956321"/>
+            <a:ext cx="1240221" cy="1839310"/>
           </a:xfrm>
-        </p:grpSpPr>
-        <p:sp>
-          <p:nvSpPr>
-            <p:cNvPr id="27" name="Rectangle 26">
-              <a:extLst>
-                <a:ext uri="{FF2B5EF4-FFF2-40B4-BE49-F238E27FC236}">
-                  <a16:creationId xmlns:a16="http://schemas.microsoft.com/office/drawing/2014/main" id="{92CBB52F-3EB0-444A-B99F-7171E9BCC9C8}"/>
-                </a:ext>
-              </a:extLst>
-            </p:cNvPr>
-            <p:cNvSpPr/>
-            <p:nvPr/>
-          </p:nvSpPr>
-          <p:spPr>
-            <a:xfrm>
-              <a:off x="3116317" y="4960784"/>
-              <a:ext cx="1240221" cy="1839310"/>
-            </a:xfrm>
-            <a:prstGeom prst="rect">
-              <a:avLst/>
-            </a:prstGeom>
-          </p:spPr>
-          <p:style>
-            <a:lnRef idx="2">
-              <a:schemeClr val="accent1">
-                <a:shade val="50000"/>
-              </a:schemeClr>
-            </a:lnRef>
-            <a:fillRef idx="1">
-              <a:schemeClr val="accent1"/>
-            </a:fillRef>
-            <a:effectRef idx="0">
-              <a:schemeClr val="accent1"/>
-            </a:effectRef>
-            <a:fontRef idx="minor">
-              <a:schemeClr val="lt1"/>
-            </a:fontRef>
-          </p:style>
-          <p:txBody>
-            <a:bodyPr rtlCol="0" anchor="ctr"/>
-            <a:lstStyle/>
-            <a:p>
-              <a:pPr algn="ctr"/>
-              <a:r>
-                <a:rPr lang="en-US" dirty="0"/>
-                <a:t>Ansible</a:t>
-              </a:r>
-            </a:p>
-            <a:p>
-              <a:pPr algn="ctr"/>
-              <a:r>
-                <a:rPr lang="en-US" dirty="0"/>
-                <a:t>22</a:t>
-              </a:r>
-            </a:p>
-          </p:txBody>
-        </p:sp>
-        <p:sp>
-          <p:nvSpPr>
-            <p:cNvPr id="22" name="Rectangle 21">
-              <a:extLst>
-                <a:ext uri="{FF2B5EF4-FFF2-40B4-BE49-F238E27FC236}">
-                  <a16:creationId xmlns:a16="http://schemas.microsoft.com/office/drawing/2014/main" id="{008FCAF0-E5A2-4148-984E-4146B98CFAF9}"/>
-                </a:ext>
-              </a:extLst>
-            </p:cNvPr>
-            <p:cNvSpPr/>
-            <p:nvPr/>
-          </p:nvSpPr>
-          <p:spPr>
-            <a:xfrm>
-              <a:off x="973507" y="4844640"/>
-              <a:ext cx="3516299" cy="2192034"/>
-            </a:xfrm>
-            <a:prstGeom prst="rect">
-              <a:avLst/>
-            </a:prstGeom>
-            <a:noFill/>
-            <a:ln w="38100"/>
-          </p:spPr>
-          <p:style>
-            <a:lnRef idx="2">
-              <a:schemeClr val="accent1">
-                <a:shade val="50000"/>
-              </a:schemeClr>
-            </a:lnRef>
-            <a:fillRef idx="1">
-              <a:schemeClr val="accent1"/>
-            </a:fillRef>
-            <a:effectRef idx="0">
-              <a:schemeClr val="accent1"/>
-            </a:effectRef>
-            <a:fontRef idx="minor">
-              <a:schemeClr val="lt1"/>
-            </a:fontRef>
-          </p:style>
-          <p:txBody>
-            <a:bodyPr rtlCol="0" anchor="ctr"/>
-            <a:lstStyle/>
-            <a:p>
-              <a:pPr algn="ctr"/>
-              <a:r>
-                <a:rPr lang="en-US" dirty="0">
-                  <a:solidFill>
-                    <a:schemeClr val="tx1"/>
-                  </a:solidFill>
-                </a:rPr>
-                <a:t>AWS </a:t>
-              </a:r>
-            </a:p>
-            <a:p>
-              <a:pPr algn="ctr"/>
-              <a:r>
-                <a:rPr lang="en-US" dirty="0">
-                  <a:solidFill>
-                    <a:schemeClr val="tx1"/>
-                  </a:solidFill>
-                </a:rPr>
-                <a:t>OPERATION</a:t>
-              </a:r>
-            </a:p>
-            <a:p>
-              <a:pPr algn="ctr"/>
-              <a:r>
-                <a:rPr lang="en-US" dirty="0">
-                  <a:solidFill>
-                    <a:schemeClr val="tx1"/>
-                  </a:solidFill>
-                </a:rPr>
-                <a:t>Account</a:t>
-              </a:r>
-            </a:p>
-          </p:txBody>
-        </p:sp>
-      </p:grpSp>
-      <p:grpSp>
-        <p:nvGrpSpPr>
-          <p:cNvPr id="23" name="Group 22">
-            <a:extLst>
-              <a:ext uri="{FF2B5EF4-FFF2-40B4-BE49-F238E27FC236}">
-                <a16:creationId xmlns:a16="http://schemas.microsoft.com/office/drawing/2014/main" id="{7D69B971-1A62-2A41-851D-05B56708348B}"/>
-              </a:ext>
-            </a:extLst>
-          </p:cNvPr>
-          <p:cNvGrpSpPr/>
+          <a:prstGeom prst="rect">
+            <a:avLst/>
+          </a:prstGeom>
+        </p:spPr>
+        <p:style>
+          <a:lnRef idx="2">
+            <a:schemeClr val="accent1">
+              <a:shade val="50000"/>
+            </a:schemeClr>
+          </a:lnRef>
+          <a:fillRef idx="1">
+            <a:schemeClr val="accent1"/>
+          </a:fillRef>
+          <a:effectRef idx="0">
+            <a:schemeClr val="accent1"/>
+          </a:effectRef>
+          <a:fontRef idx="minor">
+            <a:schemeClr val="lt1"/>
+          </a:fontRef>
+        </p:style>
+        <p:txBody>
+          <a:bodyPr rtlCol="0" anchor="ctr"/>
+          <a:lstStyle/>
+          <a:p>
+            <a:pPr algn="ctr"/>
+            <a:r>
+              <a:rPr lang="en-US" dirty="0"/>
+              <a:t>Ansible</a:t>
+            </a:r>
+          </a:p>
+          <a:p>
+            <a:pPr algn="ctr"/>
+            <a:r>
+              <a:rPr lang="en-US" dirty="0"/>
+              <a:t>22</a:t>
+            </a:r>
+          </a:p>
+        </p:txBody>
+      </p:sp>
+      <p:sp>
+        <p:nvSpPr>
+          <p:cNvPr id="22" name="Rectangle 21">
+            <a:extLst>
+              <a:ext uri="{FF2B5EF4-FFF2-40B4-BE49-F238E27FC236}">
+                <a16:creationId xmlns:a16="http://schemas.microsoft.com/office/drawing/2014/main" id="{008FCAF0-E5A2-4148-984E-4146B98CFAF9}"/>
+              </a:ext>
+            </a:extLst>
+          </p:cNvPr>
+          <p:cNvSpPr/>
           <p:nvPr/>
-        </p:nvGrpSpPr>
-        <p:grpSpPr>
+        </p:nvSpPr>
+        <p:spPr>
           <a:xfrm>
-            <a:off x="4250505" y="325163"/>
-            <a:ext cx="3516299" cy="2192034"/>
-            <a:chOff x="973508" y="2299817"/>
-            <a:chExt cx="3516299" cy="2192034"/>
+            <a:off x="309466" y="2881498"/>
+            <a:ext cx="2466904" cy="2192034"/>
           </a:xfrm>
-        </p:grpSpPr>
-        <p:sp>
-          <p:nvSpPr>
-            <p:cNvPr id="26" name="Rectangle 25">
-              <a:extLst>
-                <a:ext uri="{FF2B5EF4-FFF2-40B4-BE49-F238E27FC236}">
-                  <a16:creationId xmlns:a16="http://schemas.microsoft.com/office/drawing/2014/main" id="{6BD7370D-0340-664D-9ED6-52218BE998C2}"/>
-                </a:ext>
-              </a:extLst>
-            </p:cNvPr>
-            <p:cNvSpPr/>
-            <p:nvPr/>
-          </p:nvSpPr>
-          <p:spPr>
-            <a:xfrm>
-              <a:off x="986817" y="2501462"/>
-              <a:ext cx="1555095" cy="1839310"/>
-            </a:xfrm>
-            <a:prstGeom prst="rect">
-              <a:avLst/>
-            </a:prstGeom>
-          </p:spPr>
-          <p:style>
-            <a:lnRef idx="2">
-              <a:schemeClr val="accent1">
-                <a:shade val="50000"/>
-              </a:schemeClr>
-            </a:lnRef>
-            <a:fillRef idx="1">
-              <a:schemeClr val="accent1"/>
-            </a:fillRef>
-            <a:effectRef idx="0">
-              <a:schemeClr val="accent1"/>
-            </a:effectRef>
-            <a:fontRef idx="minor">
-              <a:schemeClr val="lt1"/>
-            </a:fontRef>
-          </p:style>
-          <p:txBody>
-            <a:bodyPr rtlCol="0" anchor="ctr"/>
-            <a:lstStyle/>
-            <a:p>
-              <a:pPr algn="ctr"/>
-              <a:r>
-                <a:rPr lang="en-US" dirty="0"/>
-                <a:t>Firewall</a:t>
-              </a:r>
-            </a:p>
-            <a:p>
-              <a:pPr algn="ctr"/>
-              <a:r>
-                <a:rPr lang="en-US" dirty="0"/>
-                <a:t>122 -&gt; 22</a:t>
-              </a:r>
-            </a:p>
-            <a:p>
-              <a:pPr algn="ctr"/>
-              <a:r>
-                <a:rPr lang="en-US" dirty="0"/>
-                <a:t>19701 -&gt; 9701</a:t>
-              </a:r>
-            </a:p>
-            <a:p>
-              <a:pPr algn="ctr"/>
-              <a:r>
-                <a:rPr lang="en-US" dirty="0"/>
-                <a:t>19702 -&gt; 9702</a:t>
-              </a:r>
-            </a:p>
-          </p:txBody>
-        </p:sp>
-        <p:sp>
-          <p:nvSpPr>
-            <p:cNvPr id="29" name="Rectangle 28">
-              <a:extLst>
-                <a:ext uri="{FF2B5EF4-FFF2-40B4-BE49-F238E27FC236}">
-                  <a16:creationId xmlns:a16="http://schemas.microsoft.com/office/drawing/2014/main" id="{40BB782C-3EE0-BA42-866D-B2328697801B}"/>
-                </a:ext>
-              </a:extLst>
-            </p:cNvPr>
-            <p:cNvSpPr/>
-            <p:nvPr/>
-          </p:nvSpPr>
-          <p:spPr>
-            <a:xfrm>
-              <a:off x="2934712" y="2501462"/>
-              <a:ext cx="1555095" cy="1839310"/>
-            </a:xfrm>
-            <a:prstGeom prst="rect">
-              <a:avLst/>
-            </a:prstGeom>
-          </p:spPr>
-          <p:style>
-            <a:lnRef idx="2">
-              <a:schemeClr val="accent1">
-                <a:shade val="50000"/>
-              </a:schemeClr>
-            </a:lnRef>
-            <a:fillRef idx="1">
-              <a:schemeClr val="accent1"/>
-            </a:fillRef>
-            <a:effectRef idx="0">
-              <a:schemeClr val="accent1"/>
-            </a:effectRef>
-            <a:fontRef idx="minor">
-              <a:schemeClr val="lt1"/>
-            </a:fontRef>
-          </p:style>
-          <p:txBody>
-            <a:bodyPr rtlCol="0" anchor="ctr"/>
-            <a:lstStyle/>
-            <a:p>
-              <a:pPr algn="ctr"/>
-              <a:r>
-                <a:rPr lang="en-US" dirty="0"/>
-                <a:t>LB</a:t>
-              </a:r>
-            </a:p>
-            <a:p>
-              <a:pPr algn="ctr"/>
-              <a:r>
-                <a:rPr lang="en-US" dirty="0"/>
-                <a:t>22 -&gt; 122</a:t>
-              </a:r>
-            </a:p>
-            <a:p>
-              <a:pPr algn="ctr"/>
-              <a:r>
-                <a:rPr lang="en-US" dirty="0"/>
-                <a:t>9701 -&gt; 19701</a:t>
-              </a:r>
-            </a:p>
-            <a:p>
-              <a:pPr algn="ctr"/>
-              <a:r>
-                <a:rPr lang="en-US" dirty="0"/>
-                <a:t>9702 -&gt; 19702</a:t>
-              </a:r>
-            </a:p>
-          </p:txBody>
-        </p:sp>
-        <p:sp>
-          <p:nvSpPr>
-            <p:cNvPr id="30" name="Rectangle 29">
-              <a:extLst>
-                <a:ext uri="{FF2B5EF4-FFF2-40B4-BE49-F238E27FC236}">
-                  <a16:creationId xmlns:a16="http://schemas.microsoft.com/office/drawing/2014/main" id="{12B4590C-F868-B347-93B6-FBE911852ABE}"/>
-                </a:ext>
-              </a:extLst>
-            </p:cNvPr>
-            <p:cNvSpPr/>
-            <p:nvPr/>
-          </p:nvSpPr>
-          <p:spPr>
-            <a:xfrm>
-              <a:off x="973508" y="2299817"/>
-              <a:ext cx="3516299" cy="2192034"/>
-            </a:xfrm>
-            <a:prstGeom prst="rect">
-              <a:avLst/>
-            </a:prstGeom>
-            <a:noFill/>
-            <a:ln w="38100"/>
-          </p:spPr>
-          <p:style>
-            <a:lnRef idx="2">
-              <a:schemeClr val="accent1">
-                <a:shade val="50000"/>
-              </a:schemeClr>
-            </a:lnRef>
-            <a:fillRef idx="1">
-              <a:schemeClr val="accent1"/>
-            </a:fillRef>
-            <a:effectRef idx="0">
-              <a:schemeClr val="accent1"/>
-            </a:effectRef>
-            <a:fontRef idx="minor">
-              <a:schemeClr val="lt1"/>
-            </a:fontRef>
-          </p:style>
-          <p:txBody>
-            <a:bodyPr rtlCol="0" anchor="ctr"/>
-            <a:lstStyle/>
-            <a:p>
-              <a:pPr algn="ctr"/>
-              <a:r>
-                <a:rPr lang="en-US" dirty="0">
-                  <a:solidFill>
-                    <a:schemeClr val="tx1"/>
-                  </a:solidFill>
-                </a:rPr>
-                <a:t>AWS </a:t>
-              </a:r>
-            </a:p>
-            <a:p>
-              <a:pPr algn="ctr"/>
-              <a:r>
-                <a:rPr lang="en-US" dirty="0">
-                  <a:solidFill>
-                    <a:schemeClr val="tx1"/>
-                  </a:solidFill>
-                </a:rPr>
-                <a:t>PERIMETER</a:t>
-              </a:r>
-            </a:p>
-            <a:p>
-              <a:pPr algn="ctr"/>
-              <a:r>
-                <a:rPr lang="en-US" dirty="0">
-                  <a:solidFill>
-                    <a:schemeClr val="tx1"/>
-                  </a:solidFill>
-                </a:rPr>
-                <a:t>Account</a:t>
-              </a:r>
-            </a:p>
-          </p:txBody>
-        </p:sp>
-      </p:grpSp>
+          <a:prstGeom prst="rect">
+            <a:avLst/>
+          </a:prstGeom>
+          <a:noFill/>
+          <a:ln w="38100"/>
+        </p:spPr>
+        <p:style>
+          <a:lnRef idx="2">
+            <a:schemeClr val="accent1">
+              <a:shade val="50000"/>
+            </a:schemeClr>
+          </a:lnRef>
+          <a:fillRef idx="1">
+            <a:schemeClr val="accent1"/>
+          </a:fillRef>
+          <a:effectRef idx="0">
+            <a:schemeClr val="accent1"/>
+          </a:effectRef>
+          <a:fontRef idx="minor">
+            <a:schemeClr val="lt1"/>
+          </a:fontRef>
+        </p:style>
+        <p:txBody>
+          <a:bodyPr rtlCol="0" anchor="ctr"/>
+          <a:lstStyle/>
+          <a:p>
+            <a:pPr algn="r"/>
+            <a:r>
+              <a:rPr lang="en-US" dirty="0">
+                <a:solidFill>
+                  <a:schemeClr val="tx1"/>
+                </a:solidFill>
+              </a:rPr>
+              <a:t>AWS </a:t>
+            </a:r>
+          </a:p>
+          <a:p>
+            <a:pPr algn="r"/>
+            <a:r>
+              <a:rPr lang="en-US" dirty="0">
+                <a:solidFill>
+                  <a:schemeClr val="tx1"/>
+                </a:solidFill>
+              </a:rPr>
+              <a:t>OPERATION</a:t>
+            </a:r>
+          </a:p>
+          <a:p>
+            <a:pPr algn="r"/>
+            <a:r>
+              <a:rPr lang="en-US" dirty="0">
+                <a:solidFill>
+                  <a:schemeClr val="tx1"/>
+                </a:solidFill>
+              </a:rPr>
+              <a:t>Account</a:t>
+            </a:r>
+          </a:p>
+        </p:txBody>
+      </p:sp>
+      <p:sp>
+        <p:nvSpPr>
+          <p:cNvPr id="26" name="Rectangle 25">
+            <a:extLst>
+              <a:ext uri="{FF2B5EF4-FFF2-40B4-BE49-F238E27FC236}">
+                <a16:creationId xmlns:a16="http://schemas.microsoft.com/office/drawing/2014/main" id="{6BD7370D-0340-664D-9ED6-52218BE998C2}"/>
+              </a:ext>
+            </a:extLst>
+          </p:cNvPr>
+          <p:cNvSpPr/>
+          <p:nvPr/>
+        </p:nvSpPr>
+        <p:spPr>
+          <a:xfrm>
+            <a:off x="2907203" y="656112"/>
+            <a:ext cx="1555095" cy="1839310"/>
+          </a:xfrm>
+          <a:prstGeom prst="rect">
+            <a:avLst/>
+          </a:prstGeom>
+        </p:spPr>
+        <p:style>
+          <a:lnRef idx="2">
+            <a:schemeClr val="accent1">
+              <a:shade val="50000"/>
+            </a:schemeClr>
+          </a:lnRef>
+          <a:fillRef idx="1">
+            <a:schemeClr val="accent1"/>
+          </a:fillRef>
+          <a:effectRef idx="0">
+            <a:schemeClr val="accent1"/>
+          </a:effectRef>
+          <a:fontRef idx="minor">
+            <a:schemeClr val="lt1"/>
+          </a:fontRef>
+        </p:style>
+        <p:txBody>
+          <a:bodyPr rtlCol="0" anchor="ctr"/>
+          <a:lstStyle/>
+          <a:p>
+            <a:pPr algn="ctr"/>
+            <a:r>
+              <a:rPr lang="en-US" dirty="0"/>
+              <a:t>Firewall</a:t>
+            </a:r>
+          </a:p>
+          <a:p>
+            <a:pPr algn="ctr"/>
+            <a:r>
+              <a:rPr lang="en-US" dirty="0">
+                <a:highlight>
+                  <a:srgbClr val="000080"/>
+                </a:highlight>
+              </a:rPr>
+              <a:t>122 -&gt; 22</a:t>
+            </a:r>
+          </a:p>
+          <a:p>
+            <a:pPr algn="ctr"/>
+            <a:r>
+              <a:rPr lang="en-US" dirty="0">
+                <a:highlight>
+                  <a:srgbClr val="000080"/>
+                </a:highlight>
+              </a:rPr>
+              <a:t>19701 -&gt; 9701</a:t>
+            </a:r>
+          </a:p>
+          <a:p>
+            <a:pPr algn="ctr"/>
+            <a:r>
+              <a:rPr lang="en-US" dirty="0">
+                <a:highlight>
+                  <a:srgbClr val="000080"/>
+                </a:highlight>
+              </a:rPr>
+              <a:t>19702 -&gt; 9702</a:t>
+            </a:r>
+          </a:p>
+        </p:txBody>
+      </p:sp>
+      <p:sp>
+        <p:nvSpPr>
+          <p:cNvPr id="29" name="Rectangle 28">
+            <a:extLst>
+              <a:ext uri="{FF2B5EF4-FFF2-40B4-BE49-F238E27FC236}">
+                <a16:creationId xmlns:a16="http://schemas.microsoft.com/office/drawing/2014/main" id="{40BB782C-3EE0-BA42-866D-B2328697801B}"/>
+              </a:ext>
+            </a:extLst>
+          </p:cNvPr>
+          <p:cNvSpPr/>
+          <p:nvPr/>
+        </p:nvSpPr>
+        <p:spPr>
+          <a:xfrm>
+            <a:off x="6211709" y="656112"/>
+            <a:ext cx="1555095" cy="1839310"/>
+          </a:xfrm>
+          <a:prstGeom prst="rect">
+            <a:avLst/>
+          </a:prstGeom>
+        </p:spPr>
+        <p:style>
+          <a:lnRef idx="2">
+            <a:schemeClr val="accent1">
+              <a:shade val="50000"/>
+            </a:schemeClr>
+          </a:lnRef>
+          <a:fillRef idx="1">
+            <a:schemeClr val="accent1"/>
+          </a:fillRef>
+          <a:effectRef idx="0">
+            <a:schemeClr val="accent1"/>
+          </a:effectRef>
+          <a:fontRef idx="minor">
+            <a:schemeClr val="lt1"/>
+          </a:fontRef>
+        </p:style>
+        <p:txBody>
+          <a:bodyPr rtlCol="0" anchor="ctr"/>
+          <a:lstStyle/>
+          <a:p>
+            <a:pPr algn="ctr"/>
+            <a:r>
+              <a:rPr lang="en-US" dirty="0"/>
+              <a:t>LB</a:t>
+            </a:r>
+          </a:p>
+          <a:p>
+            <a:pPr algn="ctr"/>
+            <a:r>
+              <a:rPr lang="en-US" dirty="0"/>
+              <a:t>22 -&gt; 122</a:t>
+            </a:r>
+          </a:p>
+          <a:p>
+            <a:pPr algn="ctr"/>
+            <a:r>
+              <a:rPr lang="en-US" dirty="0"/>
+              <a:t>9701 -&gt; 19701</a:t>
+            </a:r>
+          </a:p>
+          <a:p>
+            <a:pPr algn="ctr"/>
+            <a:r>
+              <a:rPr lang="en-US" dirty="0"/>
+              <a:t>9702 -&gt; 19702</a:t>
+            </a:r>
+          </a:p>
+        </p:txBody>
+      </p:sp>
+      <p:sp>
+        <p:nvSpPr>
+          <p:cNvPr id="30" name="Rectangle 29">
+            <a:extLst>
+              <a:ext uri="{FF2B5EF4-FFF2-40B4-BE49-F238E27FC236}">
+                <a16:creationId xmlns:a16="http://schemas.microsoft.com/office/drawing/2014/main" id="{12B4590C-F868-B347-93B6-FBE911852ABE}"/>
+              </a:ext>
+            </a:extLst>
+          </p:cNvPr>
+          <p:cNvSpPr/>
+          <p:nvPr/>
+        </p:nvSpPr>
+        <p:spPr>
+          <a:xfrm>
+            <a:off x="2901907" y="454467"/>
+            <a:ext cx="4864898" cy="4688270"/>
+          </a:xfrm>
+          <a:prstGeom prst="rect">
+            <a:avLst/>
+          </a:prstGeom>
+          <a:noFill/>
+          <a:ln w="38100"/>
+        </p:spPr>
+        <p:style>
+          <a:lnRef idx="2">
+            <a:schemeClr val="accent1">
+              <a:shade val="50000"/>
+            </a:schemeClr>
+          </a:lnRef>
+          <a:fillRef idx="1">
+            <a:schemeClr val="accent1"/>
+          </a:fillRef>
+          <a:effectRef idx="0">
+            <a:schemeClr val="accent1"/>
+          </a:effectRef>
+          <a:fontRef idx="minor">
+            <a:schemeClr val="lt1"/>
+          </a:fontRef>
+        </p:style>
+        <p:txBody>
+          <a:bodyPr rtlCol="0" anchor="ctr"/>
+          <a:lstStyle/>
+          <a:p>
+            <a:pPr algn="ctr"/>
+            <a:r>
+              <a:rPr lang="en-US" dirty="0">
+                <a:solidFill>
+                  <a:schemeClr val="tx1"/>
+                </a:solidFill>
+              </a:rPr>
+              <a:t>AWS </a:t>
+            </a:r>
+          </a:p>
+          <a:p>
+            <a:pPr algn="ctr"/>
+            <a:r>
+              <a:rPr lang="en-US" dirty="0">
+                <a:solidFill>
+                  <a:schemeClr val="tx1"/>
+                </a:solidFill>
+              </a:rPr>
+              <a:t>PERIMETER</a:t>
+            </a:r>
+          </a:p>
+          <a:p>
+            <a:pPr algn="ctr"/>
+            <a:r>
+              <a:rPr lang="en-US" dirty="0">
+                <a:solidFill>
+                  <a:schemeClr val="tx1"/>
+                </a:solidFill>
+              </a:rPr>
+              <a:t>Account</a:t>
+            </a:r>
+          </a:p>
+        </p:txBody>
+      </p:sp>
       <p:cxnSp>
         <p:nvCxnSpPr>
           <p:cNvPr id="21" name="Straight Arrow Connector 20">
@@ -4222,8 +4192,8 @@
         </p:nvCxnSpPr>
         <p:spPr>
           <a:xfrm flipH="1" flipV="1">
-            <a:off x="7369227" y="1960179"/>
-            <a:ext cx="1714278" cy="4216620"/>
+            <a:off x="7561901" y="2137062"/>
+            <a:ext cx="1914608" cy="4064827"/>
           </a:xfrm>
           <a:prstGeom prst="straightConnector1">
             <a:avLst/>
@@ -4266,8 +4236,8 @@
         </p:nvCxnSpPr>
         <p:spPr>
           <a:xfrm flipH="1" flipV="1">
-            <a:off x="7412258" y="1944413"/>
-            <a:ext cx="3145383" cy="2953409"/>
+            <a:off x="7658839" y="1998749"/>
+            <a:ext cx="3397088" cy="2918795"/>
           </a:xfrm>
           <a:prstGeom prst="straightConnector1">
             <a:avLst/>
@@ -4310,8 +4280,8 @@
         </p:nvCxnSpPr>
         <p:spPr>
           <a:xfrm flipH="1">
-            <a:off x="7514144" y="1115861"/>
-            <a:ext cx="1085148" cy="416535"/>
+            <a:off x="7536875" y="1236303"/>
+            <a:ext cx="1939634" cy="234781"/>
           </a:xfrm>
           <a:prstGeom prst="straightConnector1">
             <a:avLst/>
@@ -4354,8 +4324,8 @@
         </p:nvCxnSpPr>
         <p:spPr>
           <a:xfrm flipH="1" flipV="1">
-            <a:off x="7412259" y="1644870"/>
-            <a:ext cx="3145382" cy="1133265"/>
+            <a:off x="7682922" y="1687993"/>
+            <a:ext cx="3373005" cy="1009074"/>
           </a:xfrm>
           <a:prstGeom prst="straightConnector1">
             <a:avLst/>
@@ -4382,6 +4352,143 @@
           </a:fontRef>
         </p:style>
       </p:cxnSp>
+      <p:sp>
+        <p:nvSpPr>
+          <p:cNvPr id="28" name="Rectangle 27">
+            <a:extLst>
+              <a:ext uri="{FF2B5EF4-FFF2-40B4-BE49-F238E27FC236}">
+                <a16:creationId xmlns:a16="http://schemas.microsoft.com/office/drawing/2014/main" id="{C00E97BD-F892-1E48-BF47-65A7B6176C7C}"/>
+              </a:ext>
+            </a:extLst>
+          </p:cNvPr>
+          <p:cNvSpPr/>
+          <p:nvPr/>
+        </p:nvSpPr>
+        <p:spPr>
+          <a:xfrm>
+            <a:off x="6121983" y="3123874"/>
+            <a:ext cx="1637088" cy="1839310"/>
+          </a:xfrm>
+          <a:prstGeom prst="rect">
+            <a:avLst/>
+          </a:prstGeom>
+        </p:spPr>
+        <p:style>
+          <a:lnRef idx="2">
+            <a:schemeClr val="accent1">
+              <a:shade val="50000"/>
+            </a:schemeClr>
+          </a:lnRef>
+          <a:fillRef idx="1">
+            <a:schemeClr val="accent1"/>
+          </a:fillRef>
+          <a:effectRef idx="0">
+            <a:schemeClr val="accent1"/>
+          </a:effectRef>
+          <a:fontRef idx="minor">
+            <a:schemeClr val="lt1"/>
+          </a:fontRef>
+        </p:style>
+        <p:txBody>
+          <a:bodyPr rtlCol="0" anchor="ctr"/>
+          <a:lstStyle/>
+          <a:p>
+            <a:pPr algn="ctr"/>
+            <a:r>
+              <a:rPr lang="en-US" dirty="0"/>
+              <a:t>EIP</a:t>
+            </a:r>
+          </a:p>
+          <a:p>
+            <a:pPr algn="ctr"/>
+            <a:r>
+              <a:rPr lang="en-CA" dirty="0"/>
+              <a:t>15.222.199.136</a:t>
+            </a:r>
+          </a:p>
+          <a:p>
+            <a:pPr algn="ctr"/>
+            <a:r>
+              <a:rPr lang="en-CA" dirty="0"/>
+              <a:t>99.79.120.239</a:t>
+            </a:r>
+          </a:p>
+          <a:p>
+            <a:pPr algn="ctr"/>
+            <a:endParaRPr lang="en-US" dirty="0"/>
+          </a:p>
+        </p:txBody>
+      </p:sp>
+      <p:sp>
+        <p:nvSpPr>
+          <p:cNvPr id="31" name="Rectangle 30">
+            <a:extLst>
+              <a:ext uri="{FF2B5EF4-FFF2-40B4-BE49-F238E27FC236}">
+                <a16:creationId xmlns:a16="http://schemas.microsoft.com/office/drawing/2014/main" id="{409F681B-0A7E-E94E-B799-EA36FE30A60B}"/>
+              </a:ext>
+            </a:extLst>
+          </p:cNvPr>
+          <p:cNvSpPr/>
+          <p:nvPr/>
+        </p:nvSpPr>
+        <p:spPr>
+          <a:xfrm>
+            <a:off x="4559845" y="656112"/>
+            <a:ext cx="1555095" cy="1839310"/>
+          </a:xfrm>
+          <a:prstGeom prst="rect">
+            <a:avLst/>
+          </a:prstGeom>
+        </p:spPr>
+        <p:style>
+          <a:lnRef idx="2">
+            <a:schemeClr val="accent1">
+              <a:shade val="50000"/>
+            </a:schemeClr>
+          </a:lnRef>
+          <a:fillRef idx="1">
+            <a:schemeClr val="accent1"/>
+          </a:fillRef>
+          <a:effectRef idx="0">
+            <a:schemeClr val="accent1"/>
+          </a:effectRef>
+          <a:fontRef idx="minor">
+            <a:schemeClr val="lt1"/>
+          </a:fontRef>
+        </p:style>
+        <p:txBody>
+          <a:bodyPr rtlCol="0" anchor="ctr"/>
+          <a:lstStyle/>
+          <a:p>
+            <a:pPr algn="ctr"/>
+            <a:r>
+              <a:rPr lang="en-US" dirty="0"/>
+              <a:t>TG</a:t>
+            </a:r>
+          </a:p>
+          <a:p>
+            <a:pPr algn="ctr"/>
+            <a:r>
+              <a:rPr lang="en-US" dirty="0"/>
+              <a:t>122</a:t>
+            </a:r>
+          </a:p>
+          <a:p>
+            <a:pPr algn="ctr"/>
+            <a:r>
+              <a:rPr lang="en-US" dirty="0"/>
+              <a:t>19701</a:t>
+            </a:r>
+          </a:p>
+          <a:p>
+            <a:pPr algn="ctr"/>
+            <a:r>
+              <a:rPr lang="en-US" dirty="0"/>
+              <a:t>19702</a:t>
+            </a:r>
+          </a:p>
+        </p:txBody>
+      </p:sp>
       <p:cxnSp>
         <p:nvCxnSpPr>
           <p:cNvPr id="36" name="Straight Arrow Connector 35">
@@ -4398,8 +4505,8 @@
         </p:nvCxnSpPr>
         <p:spPr>
           <a:xfrm flipH="1">
-            <a:off x="5440219" y="2061405"/>
-            <a:ext cx="1228436" cy="0"/>
+            <a:off x="5966691" y="2190709"/>
+            <a:ext cx="434109" cy="0"/>
           </a:xfrm>
           <a:prstGeom prst="straightConnector1">
             <a:avLst/>
@@ -4441,9 +4548,9 @@
           <p:nvPr/>
         </p:nvCxnSpPr>
         <p:spPr>
-          <a:xfrm flipH="1">
-            <a:off x="1542473" y="2049246"/>
-            <a:ext cx="3156315" cy="0"/>
+          <a:xfrm flipH="1" flipV="1">
+            <a:off x="1542474" y="2178550"/>
+            <a:ext cx="1487053" cy="12159"/>
           </a:xfrm>
           <a:prstGeom prst="straightConnector1">
             <a:avLst/>

</xml_diff>